<commit_message>
optimization for data science class notes week 1,2 added
</commit_message>
<xml_diff>
--- a/ethics/Exam Presentation/Prbal_ghosh_ethics.pptx
+++ b/ethics/Exam Presentation/Prbal_ghosh_ethics.pptx
@@ -214,7 +214,7 @@
           <a:p>
             <a:fld id="{A4778E81-DA8F-4786-B94D-04958B122624}" type="datetimeFigureOut">
               <a:rPr lang="en-GB" smtClean="0"/>
-              <a:t>24/01/2024</a:t>
+              <a:t>25/01/2024</a:t>
             </a:fld>
             <a:endParaRPr lang="en-GB"/>
           </a:p>
@@ -4380,30 +4380,9 @@
         </p:spPr>
         <p:txBody>
           <a:bodyPr>
-            <a:normAutofit lnSpcReduction="10000"/>
+            <a:normAutofit/>
           </a:bodyPr>
           <a:lstStyle/>
-          <a:p>
-            <a:r>
-              <a:rPr lang="en-GB" dirty="0">
-                <a:solidFill>
-                  <a:schemeClr val="bg1">
-                    <a:lumMod val="95000"/>
-                  </a:schemeClr>
-                </a:solidFill>
-              </a:rPr>
-              <a:t>Bias has been described as the “one of the biggest risks associated with AI”.</a:t>
-            </a:r>
-            <a:endParaRPr lang="en-GB" b="0" i="0" dirty="0">
-              <a:solidFill>
-                <a:schemeClr val="bg1">
-                  <a:lumMod val="95000"/>
-                </a:schemeClr>
-              </a:solidFill>
-              <a:effectLst/>
-              <a:latin typeface="Söhne"/>
-            </a:endParaRPr>
-          </a:p>
           <a:p>
             <a:pPr algn="l">
               <a:buFont typeface="Arial" panose="020B0604020202020204" pitchFamily="34" charset="0"/>
@@ -4760,7 +4739,12 @@
             <p:ph type="title"/>
           </p:nvPr>
         </p:nvSpPr>
-        <p:spPr/>
+        <p:spPr>
+          <a:xfrm>
+            <a:off x="0" y="1"/>
+            <a:ext cx="10287000" cy="1047750"/>
+          </a:xfrm>
+        </p:spPr>
         <p:txBody>
           <a:bodyPr>
             <a:normAutofit fontScale="90000"/>
@@ -4808,8 +4792,8 @@
         </p:nvSpPr>
         <p:spPr>
           <a:xfrm>
-            <a:off x="0" y="1326996"/>
-            <a:ext cx="12192000" cy="5531004"/>
+            <a:off x="0" y="663497"/>
+            <a:ext cx="7400925" cy="6194501"/>
           </a:xfrm>
         </p:spPr>
         <p:txBody>
@@ -5032,6 +5016,53 @@
           </a:p>
         </p:txBody>
       </p:sp>
+      <p:pic>
+        <p:nvPicPr>
+          <p:cNvPr id="5122" name="Picture 2" descr="An “Unbiased” Guide to Bias in AI | by Shahrokh Barati | Towards Data  Science">
+            <a:extLst>
+              <a:ext uri="{FF2B5EF4-FFF2-40B4-BE49-F238E27FC236}">
+                <a16:creationId xmlns:a16="http://schemas.microsoft.com/office/drawing/2014/main" id="{9FC9F0F6-A714-C1A1-9F67-C90CB433027E}"/>
+              </a:ext>
+            </a:extLst>
+          </p:cNvPr>
+          <p:cNvPicPr>
+            <a:picLocks noChangeAspect="1" noChangeArrowheads="1"/>
+          </p:cNvPicPr>
+          <p:nvPr/>
+        </p:nvPicPr>
+        <p:blipFill>
+          <a:blip r:embed="rId2">
+            <a:extLst>
+              <a:ext uri="{28A0092B-C50C-407E-A947-70E740481C1C}">
+                <a14:useLocalDpi xmlns:a14="http://schemas.microsoft.com/office/drawing/2010/main" val="0"/>
+              </a:ext>
+            </a:extLst>
+          </a:blip>
+          <a:srcRect/>
+          <a:stretch>
+            <a:fillRect/>
+          </a:stretch>
+        </p:blipFill>
+        <p:spPr bwMode="auto">
+          <a:xfrm>
+            <a:off x="4939050" y="371474"/>
+            <a:ext cx="9303999" cy="5635625"/>
+          </a:xfrm>
+          <a:prstGeom prst="rect">
+            <a:avLst/>
+          </a:prstGeom>
+          <a:noFill/>
+          <a:extLst>
+            <a:ext uri="{909E8E84-426E-40DD-AFC4-6F175D3DCCD1}">
+              <a14:hiddenFill xmlns:a14="http://schemas.microsoft.com/office/drawing/2010/main">
+                <a:solidFill>
+                  <a:srgbClr val="FFFFFF"/>
+                </a:solidFill>
+              </a14:hiddenFill>
+            </a:ext>
+          </a:extLst>
+        </p:spPr>
+      </p:pic>
     </p:spTree>
     <p:extLst>
       <p:ext uri="{BB962C8B-B14F-4D97-AF65-F5344CB8AC3E}">
@@ -5641,7 +5672,7 @@
           <a:lstStyle/>
           <a:p>
             <a:r>
-              <a:rPr lang="en-GB" b="1" i="0">
+              <a:rPr lang="en-GB" b="1" i="0" dirty="0">
                 <a:solidFill>
                   <a:srgbClr val="D1D5DB"/>
                 </a:solidFill>
@@ -5651,7 +5682,7 @@
               <a:t>AI Impact Assessment</a:t>
             </a:r>
             <a:br>
-              <a:rPr lang="en-GB" b="0" i="0">
+              <a:rPr lang="en-GB" b="0" i="0" dirty="0">
                 <a:solidFill>
                   <a:srgbClr val="D1D5DB"/>
                 </a:solidFill>
@@ -5659,7 +5690,7 @@
                 <a:latin typeface="Söhne"/>
               </a:rPr>
             </a:br>
-            <a:endParaRPr lang="en-GB"/>
+            <a:endParaRPr lang="en-GB" dirty="0"/>
           </a:p>
         </p:txBody>
       </p:sp>
@@ -7443,8 +7474,8 @@
         </p:nvSpPr>
         <p:spPr>
           <a:xfrm>
-            <a:off x="79918" y="1119672"/>
-            <a:ext cx="12032164" cy="5738327"/>
+            <a:off x="79918" y="933062"/>
+            <a:ext cx="6397082" cy="5924938"/>
           </a:xfrm>
         </p:spPr>
         <p:txBody>
@@ -7588,6 +7619,53 @@
           </a:p>
         </p:txBody>
       </p:sp>
+      <p:pic>
+        <p:nvPicPr>
+          <p:cNvPr id="1026" name="Picture 2" descr="The Impact of Gender Bias in the Recruitment and Selection of Employees">
+            <a:extLst>
+              <a:ext uri="{FF2B5EF4-FFF2-40B4-BE49-F238E27FC236}">
+                <a16:creationId xmlns:a16="http://schemas.microsoft.com/office/drawing/2014/main" id="{DD5FD4D4-B415-8B8E-810A-A1200BC77E5B}"/>
+              </a:ext>
+            </a:extLst>
+          </p:cNvPr>
+          <p:cNvPicPr>
+            <a:picLocks noChangeAspect="1" noChangeArrowheads="1"/>
+          </p:cNvPicPr>
+          <p:nvPr/>
+        </p:nvPicPr>
+        <p:blipFill>
+          <a:blip r:embed="rId2">
+            <a:extLst>
+              <a:ext uri="{28A0092B-C50C-407E-A947-70E740481C1C}">
+                <a14:useLocalDpi xmlns:a14="http://schemas.microsoft.com/office/drawing/2010/main" val="0"/>
+              </a:ext>
+            </a:extLst>
+          </a:blip>
+          <a:srcRect/>
+          <a:stretch>
+            <a:fillRect/>
+          </a:stretch>
+        </p:blipFill>
+        <p:spPr bwMode="auto">
+          <a:xfrm>
+            <a:off x="6477000" y="736231"/>
+            <a:ext cx="5715000" cy="4762500"/>
+          </a:xfrm>
+          <a:prstGeom prst="rect">
+            <a:avLst/>
+          </a:prstGeom>
+          <a:noFill/>
+          <a:extLst>
+            <a:ext uri="{909E8E84-426E-40DD-AFC4-6F175D3DCCD1}">
+              <a14:hiddenFill xmlns:a14="http://schemas.microsoft.com/office/drawing/2010/main">
+                <a:solidFill>
+                  <a:srgbClr val="FFFFFF"/>
+                </a:solidFill>
+              </a14:hiddenFill>
+            </a:ext>
+          </a:extLst>
+        </p:spPr>
+      </p:pic>
     </p:spTree>
     <p:extLst>
       <p:ext uri="{BB962C8B-B14F-4D97-AF65-F5344CB8AC3E}">
@@ -7642,7 +7720,7 @@
         </p:spPr>
         <p:txBody>
           <a:bodyPr>
-            <a:normAutofit/>
+            <a:normAutofit fontScale="90000"/>
           </a:bodyPr>
           <a:lstStyle/>
           <a:p>
@@ -7650,7 +7728,7 @@
               <a:rPr lang="en-GB" sz="4000" i="0" dirty="0">
                 <a:effectLst/>
               </a:rPr>
-              <a:t>Amazon's AI Recruitment Challenge</a:t>
+              <a:t>		Amazon's AI Recruitment Challenge</a:t>
             </a:r>
             <a:endParaRPr lang="en-GB" sz="4000" dirty="0"/>
           </a:p>
@@ -7674,8 +7752,8 @@
         </p:nvSpPr>
         <p:spPr>
           <a:xfrm>
-            <a:off x="74645" y="933061"/>
-            <a:ext cx="12117355" cy="5924937"/>
+            <a:off x="74646" y="764788"/>
+            <a:ext cx="7894400" cy="5924937"/>
           </a:xfrm>
         </p:spPr>
         <p:txBody>
@@ -7847,6 +7925,53 @@
           </a:p>
         </p:txBody>
       </p:sp>
+      <p:pic>
+        <p:nvPicPr>
+          <p:cNvPr id="2050" name="Picture 2" descr="Amazon discreetly abandoned gender-biased AI-based recruiting tool">
+            <a:extLst>
+              <a:ext uri="{FF2B5EF4-FFF2-40B4-BE49-F238E27FC236}">
+                <a16:creationId xmlns:a16="http://schemas.microsoft.com/office/drawing/2014/main" id="{8C8168AB-B99C-5FD1-6E6F-B7085C521768}"/>
+              </a:ext>
+            </a:extLst>
+          </p:cNvPr>
+          <p:cNvPicPr>
+            <a:picLocks noChangeAspect="1" noChangeArrowheads="1"/>
+          </p:cNvPicPr>
+          <p:nvPr/>
+        </p:nvPicPr>
+        <p:blipFill>
+          <a:blip r:embed="rId2">
+            <a:extLst>
+              <a:ext uri="{28A0092B-C50C-407E-A947-70E740481C1C}">
+                <a14:useLocalDpi xmlns:a14="http://schemas.microsoft.com/office/drawing/2010/main" val="0"/>
+              </a:ext>
+            </a:extLst>
+          </a:blip>
+          <a:srcRect/>
+          <a:stretch>
+            <a:fillRect/>
+          </a:stretch>
+        </p:blipFill>
+        <p:spPr bwMode="auto">
+          <a:xfrm>
+            <a:off x="7969045" y="2193538"/>
+            <a:ext cx="4222955" cy="2335210"/>
+          </a:xfrm>
+          <a:prstGeom prst="rect">
+            <a:avLst/>
+          </a:prstGeom>
+          <a:noFill/>
+          <a:extLst>
+            <a:ext uri="{909E8E84-426E-40DD-AFC4-6F175D3DCCD1}">
+              <a14:hiddenFill xmlns:a14="http://schemas.microsoft.com/office/drawing/2010/main">
+                <a:solidFill>
+                  <a:srgbClr val="FFFFFF"/>
+                </a:solidFill>
+              </a14:hiddenFill>
+            </a:ext>
+          </a:extLst>
+        </p:spPr>
+      </p:pic>
     </p:spTree>
     <p:extLst>
       <p:ext uri="{BB962C8B-B14F-4D97-AF65-F5344CB8AC3E}">
@@ -8161,27 +8286,27 @@
         </p:nvSpPr>
         <p:spPr>
           <a:xfrm>
-            <a:off x="0" y="50005"/>
-            <a:ext cx="12192000" cy="1325563"/>
+            <a:off x="0" y="50006"/>
+            <a:ext cx="12192000" cy="549276"/>
           </a:xfrm>
         </p:spPr>
         <p:txBody>
           <a:bodyPr>
-            <a:normAutofit fontScale="90000"/>
+            <a:normAutofit/>
           </a:bodyPr>
           <a:lstStyle/>
           <a:p>
             <a:r>
-              <a:rPr lang="en-GB" b="1" i="0" dirty="0">
+              <a:rPr lang="en-GB" sz="3000" b="1" i="0" dirty="0">
                 <a:solidFill>
                   <a:srgbClr val="D1D5DB"/>
                 </a:solidFill>
                 <a:effectLst/>
                 <a:latin typeface="Söhne"/>
               </a:rPr>
-              <a:t>Case 2 - Discriminatory Use of AI in Law Enforcement and Predictive Policing …</a:t>
-            </a:r>
-            <a:endParaRPr lang="en-GB" dirty="0"/>
+              <a:t>Case 2 - Discriminatory Use of AI in Law Enforcement and Predictive Policing </a:t>
+            </a:r>
+            <a:endParaRPr lang="en-GB" sz="3000" dirty="0"/>
           </a:p>
         </p:txBody>
       </p:sp>
@@ -8203,8 +8328,8 @@
         </p:nvSpPr>
         <p:spPr>
           <a:xfrm>
-            <a:off x="195943" y="1511559"/>
-            <a:ext cx="11887200" cy="5038531"/>
+            <a:off x="-79373" y="599282"/>
+            <a:ext cx="11978215" cy="5038531"/>
           </a:xfrm>
         </p:spPr>
         <p:txBody>
@@ -8356,6 +8481,53 @@
           </a:p>
         </p:txBody>
       </p:sp>
+      <p:pic>
+        <p:nvPicPr>
+          <p:cNvPr id="3074" name="Picture 2">
+            <a:extLst>
+              <a:ext uri="{FF2B5EF4-FFF2-40B4-BE49-F238E27FC236}">
+                <a16:creationId xmlns:a16="http://schemas.microsoft.com/office/drawing/2014/main" id="{BDF95400-568B-6F8C-08F0-FB2C36600741}"/>
+              </a:ext>
+            </a:extLst>
+          </p:cNvPr>
+          <p:cNvPicPr>
+            <a:picLocks noChangeAspect="1" noChangeArrowheads="1"/>
+          </p:cNvPicPr>
+          <p:nvPr/>
+        </p:nvPicPr>
+        <p:blipFill>
+          <a:blip r:embed="rId2">
+            <a:extLst>
+              <a:ext uri="{28A0092B-C50C-407E-A947-70E740481C1C}">
+                <a14:useLocalDpi xmlns:a14="http://schemas.microsoft.com/office/drawing/2010/main" val="0"/>
+              </a:ext>
+            </a:extLst>
+          </a:blip>
+          <a:srcRect/>
+          <a:stretch>
+            <a:fillRect/>
+          </a:stretch>
+        </p:blipFill>
+        <p:spPr bwMode="auto">
+          <a:xfrm>
+            <a:off x="5899150" y="3514725"/>
+            <a:ext cx="5854700" cy="3293269"/>
+          </a:xfrm>
+          <a:prstGeom prst="rect">
+            <a:avLst/>
+          </a:prstGeom>
+          <a:noFill/>
+          <a:extLst>
+            <a:ext uri="{909E8E84-426E-40DD-AFC4-6F175D3DCCD1}">
+              <a14:hiddenFill xmlns:a14="http://schemas.microsoft.com/office/drawing/2010/main">
+                <a:solidFill>
+                  <a:srgbClr val="FFFFFF"/>
+                </a:solidFill>
+              </a14:hiddenFill>
+            </a:ext>
+          </a:extLst>
+        </p:spPr>
+      </p:pic>
     </p:spTree>
     <p:extLst>
       <p:ext uri="{BB962C8B-B14F-4D97-AF65-F5344CB8AC3E}">
@@ -8651,6 +8823,53 @@
           </a:p>
         </p:txBody>
       </p:sp>
+      <p:pic>
+        <p:nvPicPr>
+          <p:cNvPr id="4100" name="Picture 4" descr="Image generated by Dezgo AI and enhanced in Affinity Photo">
+            <a:extLst>
+              <a:ext uri="{FF2B5EF4-FFF2-40B4-BE49-F238E27FC236}">
+                <a16:creationId xmlns:a16="http://schemas.microsoft.com/office/drawing/2014/main" id="{811921E8-1CB3-AEF6-E3D6-3AFC30AF68B3}"/>
+              </a:ext>
+            </a:extLst>
+          </p:cNvPr>
+          <p:cNvPicPr>
+            <a:picLocks noChangeAspect="1" noChangeArrowheads="1"/>
+          </p:cNvPicPr>
+          <p:nvPr/>
+        </p:nvPicPr>
+        <p:blipFill>
+          <a:blip r:embed="rId2">
+            <a:extLst>
+              <a:ext uri="{28A0092B-C50C-407E-A947-70E740481C1C}">
+                <a14:useLocalDpi xmlns:a14="http://schemas.microsoft.com/office/drawing/2010/main" val="0"/>
+              </a:ext>
+            </a:extLst>
+          </a:blip>
+          <a:srcRect/>
+          <a:stretch>
+            <a:fillRect/>
+          </a:stretch>
+        </p:blipFill>
+        <p:spPr bwMode="auto">
+          <a:xfrm>
+            <a:off x="5181601" y="3429455"/>
+            <a:ext cx="5705474" cy="3260270"/>
+          </a:xfrm>
+          <a:prstGeom prst="rect">
+            <a:avLst/>
+          </a:prstGeom>
+          <a:noFill/>
+          <a:extLst>
+            <a:ext uri="{909E8E84-426E-40DD-AFC4-6F175D3DCCD1}">
+              <a14:hiddenFill xmlns:a14="http://schemas.microsoft.com/office/drawing/2010/main">
+                <a:solidFill>
+                  <a:srgbClr val="FFFFFF"/>
+                </a:solidFill>
+              </a14:hiddenFill>
+            </a:ext>
+          </a:extLst>
+        </p:spPr>
+      </p:pic>
     </p:spTree>
     <p:extLst>
       <p:ext uri="{BB962C8B-B14F-4D97-AF65-F5344CB8AC3E}">

</xml_diff>